<commit_message>
feat: add Menu Management Page
</commit_message>
<xml_diff>
--- a/cloud-native_frontend.pptx
+++ b/cloud-native_frontend.pptx
@@ -5,13 +5,14 @@
     <p:sldMasterId id="2147483648" r:id="rId1"/>
   </p:sldMasterIdLst>
   <p:notesMasterIdLst>
-    <p:notesMasterId r:id="rId6"/>
+    <p:notesMasterId r:id="rId7"/>
   </p:notesMasterIdLst>
   <p:sldIdLst>
     <p:sldId id="260" r:id="rId2"/>
     <p:sldId id="256" r:id="rId3"/>
     <p:sldId id="262" r:id="rId4"/>
     <p:sldId id="261" r:id="rId5"/>
+    <p:sldId id="263" r:id="rId6"/>
   </p:sldIdLst>
   <p:sldSz cx="12192000" cy="6858000"/>
   <p:notesSz cx="6858000" cy="9144000"/>
@@ -200,7 +201,7 @@
           <a:p>
             <a:fld id="{44D345AE-D906-47C8-A3F7-9D14E37AEC91}" type="datetimeFigureOut">
               <a:rPr lang="en-US" smtClean="0"/>
-              <a:t>5/22/2024</a:t>
+              <a:t>5/24/2024</a:t>
             </a:fld>
             <a:endParaRPr lang="en-US"/>
           </a:p>
@@ -614,7 +615,7 @@
           <a:p>
             <a:fld id="{6D69873F-ED25-46C5-A2FA-94818A0671AA}" type="datetimeFigureOut">
               <a:rPr lang="en-US" smtClean="0"/>
-              <a:t>5/22/2024</a:t>
+              <a:t>5/24/2024</a:t>
             </a:fld>
             <a:endParaRPr lang="en-US"/>
           </a:p>
@@ -812,7 +813,7 @@
           <a:p>
             <a:fld id="{6D69873F-ED25-46C5-A2FA-94818A0671AA}" type="datetimeFigureOut">
               <a:rPr lang="en-US" smtClean="0"/>
-              <a:t>5/22/2024</a:t>
+              <a:t>5/24/2024</a:t>
             </a:fld>
             <a:endParaRPr lang="en-US"/>
           </a:p>
@@ -1020,7 +1021,7 @@
           <a:p>
             <a:fld id="{6D69873F-ED25-46C5-A2FA-94818A0671AA}" type="datetimeFigureOut">
               <a:rPr lang="en-US" smtClean="0"/>
-              <a:t>5/22/2024</a:t>
+              <a:t>5/24/2024</a:t>
             </a:fld>
             <a:endParaRPr lang="en-US"/>
           </a:p>
@@ -1218,7 +1219,7 @@
           <a:p>
             <a:fld id="{6D69873F-ED25-46C5-A2FA-94818A0671AA}" type="datetimeFigureOut">
               <a:rPr lang="en-US" smtClean="0"/>
-              <a:t>5/22/2024</a:t>
+              <a:t>5/24/2024</a:t>
             </a:fld>
             <a:endParaRPr lang="en-US"/>
           </a:p>
@@ -1493,7 +1494,7 @@
           <a:p>
             <a:fld id="{6D69873F-ED25-46C5-A2FA-94818A0671AA}" type="datetimeFigureOut">
               <a:rPr lang="en-US" smtClean="0"/>
-              <a:t>5/22/2024</a:t>
+              <a:t>5/24/2024</a:t>
             </a:fld>
             <a:endParaRPr lang="en-US"/>
           </a:p>
@@ -1758,7 +1759,7 @@
           <a:p>
             <a:fld id="{6D69873F-ED25-46C5-A2FA-94818A0671AA}" type="datetimeFigureOut">
               <a:rPr lang="en-US" smtClean="0"/>
-              <a:t>5/22/2024</a:t>
+              <a:t>5/24/2024</a:t>
             </a:fld>
             <a:endParaRPr lang="en-US"/>
           </a:p>
@@ -2170,7 +2171,7 @@
           <a:p>
             <a:fld id="{6D69873F-ED25-46C5-A2FA-94818A0671AA}" type="datetimeFigureOut">
               <a:rPr lang="en-US" smtClean="0"/>
-              <a:t>5/22/2024</a:t>
+              <a:t>5/24/2024</a:t>
             </a:fld>
             <a:endParaRPr lang="en-US"/>
           </a:p>
@@ -2311,7 +2312,7 @@
           <a:p>
             <a:fld id="{6D69873F-ED25-46C5-A2FA-94818A0671AA}" type="datetimeFigureOut">
               <a:rPr lang="en-US" smtClean="0"/>
-              <a:t>5/22/2024</a:t>
+              <a:t>5/24/2024</a:t>
             </a:fld>
             <a:endParaRPr lang="en-US"/>
           </a:p>
@@ -2424,7 +2425,7 @@
           <a:p>
             <a:fld id="{6D69873F-ED25-46C5-A2FA-94818A0671AA}" type="datetimeFigureOut">
               <a:rPr lang="en-US" smtClean="0"/>
-              <a:t>5/22/2024</a:t>
+              <a:t>5/24/2024</a:t>
             </a:fld>
             <a:endParaRPr lang="en-US"/>
           </a:p>
@@ -2735,7 +2736,7 @@
           <a:p>
             <a:fld id="{6D69873F-ED25-46C5-A2FA-94818A0671AA}" type="datetimeFigureOut">
               <a:rPr lang="en-US" smtClean="0"/>
-              <a:t>5/22/2024</a:t>
+              <a:t>5/24/2024</a:t>
             </a:fld>
             <a:endParaRPr lang="en-US"/>
           </a:p>
@@ -3023,7 +3024,7 @@
           <a:p>
             <a:fld id="{6D69873F-ED25-46C5-A2FA-94818A0671AA}" type="datetimeFigureOut">
               <a:rPr lang="en-US" smtClean="0"/>
-              <a:t>5/22/2024</a:t>
+              <a:t>5/24/2024</a:t>
             </a:fld>
             <a:endParaRPr lang="en-US"/>
           </a:p>
@@ -3264,7 +3265,7 @@
           <a:p>
             <a:fld id="{6D69873F-ED25-46C5-A2FA-94818A0671AA}" type="datetimeFigureOut">
               <a:rPr lang="en-US" smtClean="0"/>
-              <a:t>5/22/2024</a:t>
+              <a:t>5/24/2024</a:t>
             </a:fld>
             <a:endParaRPr lang="en-US"/>
           </a:p>
@@ -9603,6 +9604,207 @@
     <p:extLst>
       <p:ext uri="{BB962C8B-B14F-4D97-AF65-F5344CB8AC3E}">
         <p14:creationId xmlns:p14="http://schemas.microsoft.com/office/powerpoint/2010/main" val="3235449166"/>
+      </p:ext>
+    </p:extLst>
+  </p:cSld>
+  <p:clrMapOvr>
+    <a:masterClrMapping/>
+  </p:clrMapOvr>
+</p:sld>
+</file>
+
+<file path=ppt/slides/slide5.xml><?xml version="1.0" encoding="utf-8"?>
+<p:sld xmlns:a="http://schemas.openxmlformats.org/drawingml/2006/main" xmlns:r="http://schemas.openxmlformats.org/officeDocument/2006/relationships" xmlns:p="http://schemas.openxmlformats.org/presentationml/2006/main">
+  <p:cSld>
+    <p:spTree>
+      <p:nvGrpSpPr>
+        <p:cNvPr id="1" name=""/>
+        <p:cNvGrpSpPr/>
+        <p:nvPr/>
+      </p:nvGrpSpPr>
+      <p:grpSpPr>
+        <a:xfrm>
+          <a:off x="0" y="0"/>
+          <a:ext cx="0" cy="0"/>
+          <a:chOff x="0" y="0"/>
+          <a:chExt cx="0" cy="0"/>
+        </a:xfrm>
+      </p:grpSpPr>
+      <p:sp>
+        <p:nvSpPr>
+          <p:cNvPr id="2" name="Title 1">
+            <a:extLst>
+              <a:ext uri="{FF2B5EF4-FFF2-40B4-BE49-F238E27FC236}">
+                <a16:creationId xmlns:a16="http://schemas.microsoft.com/office/drawing/2014/main" id="{B5FD1EE0-6E3F-4D97-A14F-DF372C72E61D}"/>
+              </a:ext>
+            </a:extLst>
+          </p:cNvPr>
+          <p:cNvSpPr>
+            <a:spLocks noGrp="1"/>
+          </p:cNvSpPr>
+          <p:nvPr>
+            <p:ph type="title"/>
+          </p:nvPr>
+        </p:nvSpPr>
+        <p:spPr/>
+        <p:txBody>
+          <a:bodyPr/>
+          <a:lstStyle/>
+          <a:p>
+            <a:endParaRPr lang="en-US"/>
+          </a:p>
+        </p:txBody>
+      </p:sp>
+      <p:pic>
+        <p:nvPicPr>
+          <p:cNvPr id="4" name="Picture 3">
+            <a:extLst>
+              <a:ext uri="{FF2B5EF4-FFF2-40B4-BE49-F238E27FC236}">
+                <a16:creationId xmlns:a16="http://schemas.microsoft.com/office/drawing/2014/main" id="{5433CF1C-6E84-48CC-9D93-CAB5FCD7AC83}"/>
+              </a:ext>
+            </a:extLst>
+          </p:cNvPr>
+          <p:cNvPicPr>
+            <a:picLocks noChangeAspect="1"/>
+          </p:cNvPicPr>
+          <p:nvPr/>
+        </p:nvPicPr>
+        <p:blipFill>
+          <a:blip r:embed="rId2"/>
+          <a:stretch>
+            <a:fillRect/>
+          </a:stretch>
+        </p:blipFill>
+        <p:spPr>
+          <a:xfrm>
+            <a:off x="-38990" y="-2889"/>
+            <a:ext cx="12230989" cy="6863778"/>
+          </a:xfrm>
+          <a:prstGeom prst="rect">
+            <a:avLst/>
+          </a:prstGeom>
+        </p:spPr>
+      </p:pic>
+      <p:pic>
+        <p:nvPicPr>
+          <p:cNvPr id="5" name="Picture 4">
+            <a:extLst>
+              <a:ext uri="{FF2B5EF4-FFF2-40B4-BE49-F238E27FC236}">
+                <a16:creationId xmlns:a16="http://schemas.microsoft.com/office/drawing/2014/main" id="{209E87F6-2A67-489D-A00E-E148C6CC91FB}"/>
+              </a:ext>
+            </a:extLst>
+          </p:cNvPr>
+          <p:cNvPicPr>
+            <a:picLocks noChangeAspect="1"/>
+          </p:cNvPicPr>
+          <p:nvPr/>
+        </p:nvPicPr>
+        <p:blipFill>
+          <a:blip r:embed="rId3"/>
+          <a:stretch>
+            <a:fillRect/>
+          </a:stretch>
+        </p:blipFill>
+        <p:spPr>
+          <a:xfrm>
+            <a:off x="228960" y="636440"/>
+            <a:ext cx="6776385" cy="234280"/>
+          </a:xfrm>
+          <a:prstGeom prst="rect">
+            <a:avLst/>
+          </a:prstGeom>
+        </p:spPr>
+      </p:pic>
+      <p:sp>
+        <p:nvSpPr>
+          <p:cNvPr id="6" name="Google Shape;488;p60">
+            <a:extLst>
+              <a:ext uri="{FF2B5EF4-FFF2-40B4-BE49-F238E27FC236}">
+                <a16:creationId xmlns:a16="http://schemas.microsoft.com/office/drawing/2014/main" id="{01CFED3D-A680-4566-9F19-48E5C280D1B1}"/>
+              </a:ext>
+            </a:extLst>
+          </p:cNvPr>
+          <p:cNvSpPr txBox="1">
+            <a:spLocks/>
+          </p:cNvSpPr>
+          <p:nvPr/>
+        </p:nvSpPr>
+        <p:spPr>
+          <a:xfrm>
+            <a:off x="115504" y="38629"/>
+            <a:ext cx="6889842" cy="572700"/>
+          </a:xfrm>
+          <a:prstGeom prst="rect">
+            <a:avLst/>
+          </a:prstGeom>
+        </p:spPr>
+        <p:txBody>
+          <a:bodyPr spcFirstLastPara="1" vert="horz" wrap="square" lIns="91425" tIns="91425" rIns="91425" bIns="91425" rtlCol="0" anchor="t" anchorCtr="0">
+            <a:noAutofit/>
+          </a:bodyPr>
+          <a:lstStyle>
+            <a:lvl1pPr algn="ctr" defTabSz="914400" rtl="0" eaLnBrk="1" latinLnBrk="0" hangingPunct="1">
+              <a:lnSpc>
+                <a:spcPct val="90000"/>
+              </a:lnSpc>
+              <a:spcBef>
+                <a:spcPct val="0"/>
+              </a:spcBef>
+              <a:buNone/>
+              <a:defRPr sz="6000" kern="1200">
+                <a:solidFill>
+                  <a:schemeClr val="tx1"/>
+                </a:solidFill>
+                <a:latin typeface="+mj-lt"/>
+                <a:ea typeface="+mj-ea"/>
+                <a:cs typeface="+mj-cs"/>
+              </a:defRPr>
+            </a:lvl1pPr>
+          </a:lstStyle>
+          <a:p>
+            <a:pPr algn="l"/>
+            <a:r>
+              <a:rPr lang="en-US" altLang="zh-CN" sz="4400" dirty="0"/>
+              <a:t>Menu Management Page</a:t>
+            </a:r>
+            <a:endParaRPr lang="en-US" sz="4400" dirty="0"/>
+          </a:p>
+        </p:txBody>
+      </p:sp>
+      <p:pic>
+        <p:nvPicPr>
+          <p:cNvPr id="51" name="Picture 50">
+            <a:extLst>
+              <a:ext uri="{FF2B5EF4-FFF2-40B4-BE49-F238E27FC236}">
+                <a16:creationId xmlns:a16="http://schemas.microsoft.com/office/drawing/2014/main" id="{7DC3EDD5-21ED-49C0-9583-3D841A0CB94D}"/>
+              </a:ext>
+            </a:extLst>
+          </p:cNvPr>
+          <p:cNvPicPr>
+            <a:picLocks noChangeAspect="1"/>
+          </p:cNvPicPr>
+          <p:nvPr/>
+        </p:nvPicPr>
+        <p:blipFill>
+          <a:blip r:embed="rId4"/>
+          <a:stretch>
+            <a:fillRect/>
+          </a:stretch>
+        </p:blipFill>
+        <p:spPr>
+          <a:xfrm>
+            <a:off x="662626" y="895830"/>
+            <a:ext cx="10866748" cy="5755981"/>
+          </a:xfrm>
+          <a:prstGeom prst="rect">
+            <a:avLst/>
+          </a:prstGeom>
+        </p:spPr>
+      </p:pic>
+    </p:spTree>
+    <p:extLst>
+      <p:ext uri="{BB962C8B-B14F-4D97-AF65-F5344CB8AC3E}">
+        <p14:creationId xmlns:p14="http://schemas.microsoft.com/office/powerpoint/2010/main" val="1925881777"/>
       </p:ext>
     </p:extLst>
   </p:cSld>

</xml_diff>